<commit_message>
Laporan + file presentasi finale
</commit_message>
<xml_diff>
--- a/Presentasi PDL.pptx
+++ b/Presentasi PDL.pptx
@@ -113,7 +113,7 @@
   </p:defaultTextStyle>
   <p:extLst>
     <p:ext uri="{EFAFB233-063F-42B5-8137-9DF3F51BA10A}">
-      <p15:sldGuideLst xmlns="" xmlns:p15="http://schemas.microsoft.com/office/powerpoint/2012/main">
+      <p15:sldGuideLst xmlns:p15="http://schemas.microsoft.com/office/powerpoint/2012/main" xmlns="">
         <p15:guide id="1" orient="horz" pos="2160">
           <p15:clr>
             <a:srgbClr val="A4A3A4"/>
@@ -6144,45 +6144,206 @@
           <a:bodyPr/>
           <a:lstStyle/>
           <a:p>
-            <a:r>
-              <a:rPr lang="en-US" dirty="0" err="1" smtClean="0"/>
+            <a:pPr lvl="0"/>
+            <a:r>
+              <a:rPr lang="en-US" dirty="0" err="1"/>
               <a:t>PostGIS</a:t>
             </a:r>
             <a:r>
-              <a:rPr lang="en-US" dirty="0" smtClean="0"/>
-              <a:t> </a:t>
-            </a:r>
-            <a:r>
-              <a:rPr lang="en-US" dirty="0" err="1" smtClean="0"/>
+              <a:rPr lang="en-US" dirty="0"/>
+              <a:t> </a:t>
+            </a:r>
+            <a:r>
+              <a:rPr lang="en-US" dirty="0" err="1"/>
+              <a:t>merupakan</a:t>
+            </a:r>
+            <a:r>
+              <a:rPr lang="en-US" dirty="0"/>
+              <a:t> basis data yang </a:t>
+            </a:r>
+            <a:r>
+              <a:rPr lang="en-US" dirty="0" err="1"/>
+              <a:t>sudah</a:t>
+            </a:r>
+            <a:r>
+              <a:rPr lang="en-US" dirty="0"/>
+              <a:t> </a:t>
+            </a:r>
+            <a:r>
+              <a:rPr lang="en-US" dirty="0" err="1"/>
+              <a:t>sangat</a:t>
+            </a:r>
+            <a:r>
+              <a:rPr lang="en-US" dirty="0"/>
+              <a:t> </a:t>
+            </a:r>
+            <a:r>
+              <a:rPr lang="en-US" dirty="0" err="1"/>
+              <a:t>baik</a:t>
+            </a:r>
+            <a:r>
+              <a:rPr lang="en-US" dirty="0"/>
+              <a:t> </a:t>
+            </a:r>
+            <a:r>
+              <a:rPr lang="en-US" dirty="0" err="1"/>
+              <a:t>dalam</a:t>
+            </a:r>
+            <a:r>
+              <a:rPr lang="en-US" dirty="0"/>
+              <a:t> </a:t>
+            </a:r>
+            <a:r>
+              <a:rPr lang="en-US" dirty="0" err="1"/>
+              <a:t>pengelolaan</a:t>
+            </a:r>
+            <a:r>
+              <a:rPr lang="en-US" dirty="0"/>
+              <a:t> basis data spatial.</a:t>
+            </a:r>
+          </a:p>
+          <a:p>
+            <a:pPr lvl="0"/>
+            <a:r>
+              <a:rPr lang="en-US" dirty="0"/>
+              <a:t>Query </a:t>
+            </a:r>
+            <a:r>
+              <a:rPr lang="en-US" dirty="0" err="1"/>
               <a:t>dapat</a:t>
             </a:r>
             <a:r>
-              <a:rPr lang="en-US" dirty="0" smtClean="0"/>
-              <a:t> </a:t>
-            </a:r>
-            <a:r>
-              <a:rPr lang="en-US" dirty="0" err="1" smtClean="0"/>
-              <a:t>menjalankan</a:t>
-            </a:r>
-            <a:r>
-              <a:rPr lang="en-US" dirty="0" smtClean="0"/>
-              <a:t> query-query basis data spatial </a:t>
-            </a:r>
-            <a:r>
-              <a:rPr lang="en-US" dirty="0" err="1" smtClean="0"/>
+              <a:rPr lang="en-US" dirty="0"/>
+              <a:t> </a:t>
+            </a:r>
+            <a:r>
+              <a:rPr lang="en-US" dirty="0" err="1"/>
+              <a:t>dijalankan</a:t>
+            </a:r>
+            <a:r>
+              <a:rPr lang="en-US" dirty="0"/>
+              <a:t> </a:t>
+            </a:r>
+            <a:r>
+              <a:rPr lang="en-US" dirty="0" err="1"/>
               <a:t>dengan</a:t>
             </a:r>
             <a:r>
-              <a:rPr lang="en-US" dirty="0" smtClean="0"/>
-              <a:t> </a:t>
-            </a:r>
-            <a:r>
-              <a:rPr lang="en-US" dirty="0" err="1" smtClean="0"/>
+              <a:rPr lang="en-US" dirty="0"/>
+              <a:t> </a:t>
+            </a:r>
+            <a:r>
+              <a:rPr lang="en-US" dirty="0" err="1"/>
               <a:t>baik</a:t>
             </a:r>
-            <a:endParaRPr lang="en-US" dirty="0" smtClean="0"/>
-          </a:p>
-          <a:p>
+            <a:r>
+              <a:rPr lang="en-US" dirty="0"/>
+              <a:t> </a:t>
+            </a:r>
+            <a:r>
+              <a:rPr lang="en-US" dirty="0" err="1"/>
+              <a:t>dalam</a:t>
+            </a:r>
+            <a:r>
+              <a:rPr lang="en-US" dirty="0"/>
+              <a:t> </a:t>
+            </a:r>
+            <a:r>
+              <a:rPr lang="en-US" dirty="0" err="1"/>
+              <a:t>PostGIS</a:t>
+            </a:r>
+            <a:r>
+              <a:rPr lang="en-US" dirty="0"/>
+              <a:t>.</a:t>
+            </a:r>
+          </a:p>
+          <a:p>
+            <a:pPr lvl="0"/>
+            <a:r>
+              <a:rPr lang="en-US" dirty="0" err="1"/>
+              <a:t>Aplikasi</a:t>
+            </a:r>
+            <a:r>
+              <a:rPr lang="en-US" dirty="0"/>
+              <a:t> </a:t>
+            </a:r>
+            <a:r>
+              <a:rPr lang="en-US" dirty="0" err="1"/>
+              <a:t>berbasis</a:t>
+            </a:r>
+            <a:r>
+              <a:rPr lang="en-US" dirty="0"/>
+              <a:t> web </a:t>
+            </a:r>
+            <a:r>
+              <a:rPr lang="en-US" dirty="0" err="1"/>
+              <a:t>dapat</a:t>
+            </a:r>
+            <a:r>
+              <a:rPr lang="en-US" dirty="0"/>
+              <a:t> </a:t>
+            </a:r>
+            <a:r>
+              <a:rPr lang="en-US" dirty="0" err="1"/>
+              <a:t>disambungkan</a:t>
+            </a:r>
+            <a:r>
+              <a:rPr lang="en-US" dirty="0"/>
+              <a:t> </a:t>
+            </a:r>
+            <a:r>
+              <a:rPr lang="en-US" dirty="0" err="1"/>
+              <a:t>dengan</a:t>
+            </a:r>
+            <a:r>
+              <a:rPr lang="en-US" dirty="0"/>
+              <a:t> </a:t>
+            </a:r>
+            <a:r>
+              <a:rPr lang="en-US" dirty="0" err="1"/>
+              <a:t>mudah</a:t>
+            </a:r>
+            <a:r>
+              <a:rPr lang="en-US" dirty="0"/>
+              <a:t> </a:t>
+            </a:r>
+            <a:r>
+              <a:rPr lang="en-US" dirty="0" err="1"/>
+              <a:t>dengan</a:t>
+            </a:r>
+            <a:r>
+              <a:rPr lang="en-US" dirty="0"/>
+              <a:t> </a:t>
+            </a:r>
+            <a:r>
+              <a:rPr lang="en-US" dirty="0" err="1"/>
+              <a:t>PostgreSQL</a:t>
+            </a:r>
+            <a:r>
+              <a:rPr lang="en-US" dirty="0"/>
+              <a:t> </a:t>
+            </a:r>
+            <a:r>
+              <a:rPr lang="en-US" dirty="0" err="1"/>
+              <a:t>dengan</a:t>
+            </a:r>
+            <a:r>
+              <a:rPr lang="en-US" dirty="0"/>
+              <a:t> </a:t>
+            </a:r>
+            <a:r>
+              <a:rPr lang="en-US" dirty="0" err="1"/>
+              <a:t>menggunakan</a:t>
+            </a:r>
+            <a:r>
+              <a:rPr lang="en-US" dirty="0"/>
+              <a:t> PHP.</a:t>
+            </a:r>
+          </a:p>
+          <a:p>
+            <a:pPr marL="0" indent="0">
+              <a:buNone/>
+            </a:pPr>
             <a:endParaRPr lang="en-US" dirty="0"/>
           </a:p>
         </p:txBody>

</xml_diff>